<commit_message>
Update er diagram and db design part of presentation
</commit_message>
<xml_diff>
--- a/Presentation.pptx
+++ b/Presentation.pptx
@@ -6,19 +6,20 @@
   </p:sldMasterIdLst>
   <p:sldIdLst>
     <p:sldId id="257" r:id="rId5"/>
-    <p:sldId id="258" r:id="rId6"/>
-    <p:sldId id="260" r:id="rId7"/>
-    <p:sldId id="261" r:id="rId8"/>
-    <p:sldId id="262" r:id="rId9"/>
-    <p:sldId id="264" r:id="rId10"/>
-    <p:sldId id="266" r:id="rId11"/>
-    <p:sldId id="265" r:id="rId12"/>
-    <p:sldId id="267" r:id="rId13"/>
-    <p:sldId id="263" r:id="rId14"/>
-    <p:sldId id="268" r:id="rId15"/>
-    <p:sldId id="269" r:id="rId16"/>
-    <p:sldId id="271" r:id="rId17"/>
-    <p:sldId id="270" r:id="rId18"/>
+    <p:sldId id="260" r:id="rId6"/>
+    <p:sldId id="261" r:id="rId7"/>
+    <p:sldId id="262" r:id="rId8"/>
+    <p:sldId id="272" r:id="rId9"/>
+    <p:sldId id="274" r:id="rId10"/>
+    <p:sldId id="264" r:id="rId11"/>
+    <p:sldId id="266" r:id="rId12"/>
+    <p:sldId id="265" r:id="rId13"/>
+    <p:sldId id="267" r:id="rId14"/>
+    <p:sldId id="263" r:id="rId15"/>
+    <p:sldId id="268" r:id="rId16"/>
+    <p:sldId id="269" r:id="rId17"/>
+    <p:sldId id="271" r:id="rId18"/>
+    <p:sldId id="270" r:id="rId19"/>
   </p:sldIdLst>
   <p:sldSz cx="12192000" cy="6858000"/>
   <p:notesSz cx="6858000" cy="9144000"/>
@@ -594,7 +595,7 @@
           <a:p>
             <a:fld id="{EA0C0817-A112-4847-8014-A94B7D2A4EA3}" type="datetime1">
               <a:rPr lang="en-US" smtClean="0"/>
-              <a:t>10/28/2021</a:t>
+              <a:t>11/9/2021</a:t>
             </a:fld>
             <a:endParaRPr lang="en-US" dirty="0"/>
           </a:p>
@@ -796,7 +797,7 @@
           <a:p>
             <a:fld id="{7332B432-ACDA-4023-A761-2BAB76577B62}" type="datetime1">
               <a:rPr lang="en-US" smtClean="0"/>
-              <a:t>10/28/2021</a:t>
+              <a:t>11/9/2021</a:t>
             </a:fld>
             <a:endParaRPr lang="en-US" dirty="0"/>
           </a:p>
@@ -1395,7 +1396,7 @@
           <a:p>
             <a:fld id="{D9C646AA-F36E-4540-911D-FFFC0A0EF24A}" type="datetime1">
               <a:rPr lang="en-US" smtClean="0"/>
-              <a:t>10/28/2021</a:t>
+              <a:t>11/9/2021</a:t>
             </a:fld>
             <a:endParaRPr lang="en-US" dirty="0"/>
           </a:p>
@@ -1715,7 +1716,7 @@
           <a:p>
             <a:fld id="{69186D26-FA5F-4637-B602-B7C2DC34CFD4}" type="datetime1">
               <a:rPr lang="en-US" smtClean="0"/>
-              <a:t>10/28/2021</a:t>
+              <a:t>11/9/2021</a:t>
             </a:fld>
             <a:endParaRPr lang="en-US" dirty="0"/>
           </a:p>
@@ -2152,7 +2153,7 @@
           <a:p>
             <a:fld id="{8A7F15D8-96D1-4781-BC50-CA8A088B2FE4}" type="datetime1">
               <a:rPr lang="en-US" smtClean="0"/>
-              <a:t>10/28/2021</a:t>
+              <a:t>11/9/2021</a:t>
             </a:fld>
             <a:endParaRPr lang="en-US" dirty="0"/>
           </a:p>
@@ -2270,7 +2271,7 @@
           <a:p>
             <a:fld id="{F9A96C99-B8F8-4528-BD05-0E16E943DC09}" type="datetime1">
               <a:rPr lang="en-US" smtClean="0"/>
-              <a:t>10/28/2021</a:t>
+              <a:t>11/9/2021</a:t>
             </a:fld>
             <a:endParaRPr lang="en-US" dirty="0"/>
           </a:p>
@@ -2365,7 +2366,7 @@
           <a:p>
             <a:fld id="{03636942-C211-4B28-8DBD-C953E00AF71B}" type="datetime1">
               <a:rPr lang="en-US" smtClean="0"/>
-              <a:t>10/28/2021</a:t>
+              <a:t>11/9/2021</a:t>
             </a:fld>
             <a:endParaRPr lang="en-US" dirty="0"/>
           </a:p>
@@ -2782,7 +2783,7 @@
           <a:p>
             <a:fld id="{7E8D12A6-918A-48BD-8CB9-CA713993B0EA}" type="datetime1">
               <a:rPr lang="en-US" smtClean="0"/>
-              <a:t>10/28/2021</a:t>
+              <a:t>11/9/2021</a:t>
             </a:fld>
             <a:endParaRPr lang="en-US" dirty="0"/>
           </a:p>
@@ -3044,7 +3045,7 @@
             <a:fld id="{E778CE86-875F-4587-BCF6-FA054AFC0D53}" type="datetime1">
               <a:rPr lang="en-US" smtClean="0"/>
               <a:pPr/>
-              <a:t>10/28/2021</a:t>
+              <a:t>11/9/2021</a:t>
             </a:fld>
             <a:endParaRPr lang="en-US" dirty="0"/>
           </a:p>
@@ -3560,7 +3561,7 @@
           <a:p>
             <a:fld id="{F6FA2B21-3FCD-4721-B95C-427943F61125}" type="datetime1">
               <a:rPr lang="en-US" smtClean="0"/>
-              <a:t>10/28/2021</a:t>
+              <a:t>11/9/2021</a:t>
             </a:fld>
             <a:endParaRPr lang="en-US" dirty="0"/>
           </a:p>
@@ -4302,6 +4303,103 @@
           <a:chExt cx="0" cy="0"/>
         </a:xfrm>
       </p:grpSpPr>
+      <p:sp>
+        <p:nvSpPr>
+          <p:cNvPr id="2" name="Title 1">
+            <a:extLst>
+              <a:ext uri="{FF2B5EF4-FFF2-40B4-BE49-F238E27FC236}">
+                <a16:creationId xmlns:a16="http://schemas.microsoft.com/office/drawing/2014/main" id="{3BDBC1AB-A63D-40DE-878A-BED9F6D28E1D}"/>
+              </a:ext>
+            </a:extLst>
+          </p:cNvPr>
+          <p:cNvSpPr>
+            <a:spLocks noGrp="1"/>
+          </p:cNvSpPr>
+          <p:nvPr>
+            <p:ph type="title"/>
+          </p:nvPr>
+        </p:nvSpPr>
+        <p:spPr/>
+        <p:txBody>
+          <a:bodyPr/>
+          <a:lstStyle/>
+          <a:p>
+            <a:r>
+              <a:rPr lang="en-US" dirty="0"/>
+              <a:t>DatabaseGui.java</a:t>
+            </a:r>
+          </a:p>
+        </p:txBody>
+      </p:sp>
+      <p:sp>
+        <p:nvSpPr>
+          <p:cNvPr id="3" name="Content Placeholder 2">
+            <a:extLst>
+              <a:ext uri="{FF2B5EF4-FFF2-40B4-BE49-F238E27FC236}">
+                <a16:creationId xmlns:a16="http://schemas.microsoft.com/office/drawing/2014/main" id="{E4D8D43C-BACC-47CE-BF77-00C22AF84C52}"/>
+              </a:ext>
+            </a:extLst>
+          </p:cNvPr>
+          <p:cNvSpPr>
+            <a:spLocks noGrp="1"/>
+          </p:cNvSpPr>
+          <p:nvPr>
+            <p:ph idx="1"/>
+          </p:nvPr>
+        </p:nvSpPr>
+        <p:spPr/>
+        <p:txBody>
+          <a:bodyPr>
+            <a:normAutofit/>
+          </a:bodyPr>
+          <a:lstStyle/>
+          <a:p>
+            <a:r>
+              <a:rPr lang="en-US" sz="2400" dirty="0"/>
+              <a:t>DatabaseGui.java is our most complex class, defining the look and frontside functionality of the application.</a:t>
+            </a:r>
+          </a:p>
+          <a:p>
+            <a:r>
+              <a:rPr lang="en-US" sz="2400" dirty="0"/>
+              <a:t>The user interface was developed using Java’s Swing library.</a:t>
+            </a:r>
+          </a:p>
+          <a:p>
+            <a:endParaRPr lang="en-US" sz="2400" dirty="0"/>
+          </a:p>
+        </p:txBody>
+      </p:sp>
+    </p:spTree>
+    <p:extLst>
+      <p:ext uri="{BB962C8B-B14F-4D97-AF65-F5344CB8AC3E}">
+        <p14:creationId xmlns:p14="http://schemas.microsoft.com/office/powerpoint/2010/main" val="1225234224"/>
+      </p:ext>
+    </p:extLst>
+  </p:cSld>
+  <p:clrMapOvr>
+    <a:masterClrMapping/>
+  </p:clrMapOvr>
+</p:sld>
+</file>
+
+<file path=ppt/slides/slide11.xml><?xml version="1.0" encoding="utf-8"?>
+<p:sld xmlns:a="http://schemas.openxmlformats.org/drawingml/2006/main" xmlns:r="http://schemas.openxmlformats.org/officeDocument/2006/relationships" xmlns:p="http://schemas.openxmlformats.org/presentationml/2006/main">
+  <p:cSld>
+    <p:spTree>
+      <p:nvGrpSpPr>
+        <p:cNvPr id="1" name=""/>
+        <p:cNvGrpSpPr/>
+        <p:nvPr/>
+      </p:nvGrpSpPr>
+      <p:grpSpPr>
+        <a:xfrm>
+          <a:off x="0" y="0"/>
+          <a:ext cx="0" cy="0"/>
+          <a:chOff x="0" y="0"/>
+          <a:chExt cx="0" cy="0"/>
+        </a:xfrm>
+      </p:grpSpPr>
       <p:pic>
         <p:nvPicPr>
           <p:cNvPr id="7" name="Picture 6" descr="Text&#10;&#10;Description automatically generated">
@@ -4345,7 +4443,7 @@
 </p:sld>
 </file>
 
-<file path=ppt/slides/slide11.xml><?xml version="1.0" encoding="utf-8"?>
+<file path=ppt/slides/slide12.xml><?xml version="1.0" encoding="utf-8"?>
 <p:sld xmlns:a="http://schemas.openxmlformats.org/drawingml/2006/main" xmlns:r="http://schemas.openxmlformats.org/officeDocument/2006/relationships" xmlns:p="http://schemas.openxmlformats.org/presentationml/2006/main">
   <p:cSld>
     <p:spTree>
@@ -4450,7 +4548,7 @@
 </p:sld>
 </file>
 
-<file path=ppt/slides/slide12.xml><?xml version="1.0" encoding="utf-8"?>
+<file path=ppt/slides/slide13.xml><?xml version="1.0" encoding="utf-8"?>
 <p:sld xmlns:a="http://schemas.openxmlformats.org/drawingml/2006/main" xmlns:r="http://schemas.openxmlformats.org/officeDocument/2006/relationships" xmlns:p="http://schemas.openxmlformats.org/presentationml/2006/main">
   <p:cSld>
     <p:spTree>
@@ -4594,7 +4692,7 @@
 </p:sld>
 </file>
 
-<file path=ppt/slides/slide13.xml><?xml version="1.0" encoding="utf-8"?>
+<file path=ppt/slides/slide14.xml><?xml version="1.0" encoding="utf-8"?>
 <p:sld xmlns:a="http://schemas.openxmlformats.org/drawingml/2006/main" xmlns:r="http://schemas.openxmlformats.org/officeDocument/2006/relationships" xmlns:p="http://schemas.openxmlformats.org/presentationml/2006/main">
   <p:cSld>
     <p:spTree>
@@ -4749,7 +4847,7 @@
 </p:sld>
 </file>
 
-<file path=ppt/slides/slide14.xml><?xml version="1.0" encoding="utf-8"?>
+<file path=ppt/slides/slide15.xml><?xml version="1.0" encoding="utf-8"?>
 <p:sld xmlns:a="http://schemas.openxmlformats.org/drawingml/2006/main" xmlns:r="http://schemas.openxmlformats.org/officeDocument/2006/relationships" xmlns:p="http://schemas.openxmlformats.org/presentationml/2006/main">
   <p:cSld>
     <p:spTree>
@@ -4922,90 +5020,43 @@
           <a:chExt cx="0" cy="0"/>
         </a:xfrm>
       </p:grpSpPr>
-      <p:sp>
-        <p:nvSpPr>
-          <p:cNvPr id="2" name="Title 1">
+      <p:pic>
+        <p:nvPicPr>
+          <p:cNvPr id="5" name="Content Placeholder 4">
             <a:extLst>
               <a:ext uri="{FF2B5EF4-FFF2-40B4-BE49-F238E27FC236}">
-                <a16:creationId xmlns:a16="http://schemas.microsoft.com/office/drawing/2014/main" id="{E0948285-257F-4121-A289-F76AFB6B8D39}"/>
+                <a16:creationId xmlns:a16="http://schemas.microsoft.com/office/drawing/2014/main" id="{D06BF12F-DA46-4F34-AEA9-F8A2AABB395F}"/>
               </a:ext>
             </a:extLst>
           </p:cNvPr>
-          <p:cNvSpPr>
-            <a:spLocks noGrp="1"/>
-          </p:cNvSpPr>
-          <p:nvPr>
-            <p:ph type="title"/>
-          </p:nvPr>
-        </p:nvSpPr>
-        <p:spPr/>
-        <p:txBody>
-          <a:bodyPr/>
-          <a:lstStyle/>
-          <a:p>
-            <a:r>
-              <a:rPr lang="en-US" dirty="0"/>
-              <a:t>Database Design</a:t>
-            </a:r>
-          </a:p>
-        </p:txBody>
-      </p:sp>
-      <p:sp>
-        <p:nvSpPr>
-          <p:cNvPr id="3" name="Content Placeholder 2">
-            <a:extLst>
-              <a:ext uri="{FF2B5EF4-FFF2-40B4-BE49-F238E27FC236}">
-                <a16:creationId xmlns:a16="http://schemas.microsoft.com/office/drawing/2014/main" id="{383C03A9-A9E7-4EDF-A067-EB22D74F528A}"/>
-              </a:ext>
-            </a:extLst>
-          </p:cNvPr>
-          <p:cNvSpPr>
-            <a:spLocks noGrp="1"/>
-          </p:cNvSpPr>
+          <p:cNvPicPr>
+            <a:picLocks noGrp="1" noChangeAspect="1"/>
+          </p:cNvPicPr>
           <p:nvPr>
             <p:ph idx="1"/>
           </p:nvPr>
-        </p:nvSpPr>
-        <p:spPr/>
-        <p:txBody>
-          <a:bodyPr>
-            <a:normAutofit/>
-          </a:bodyPr>
-          <a:lstStyle/>
-          <a:p>
-            <a:r>
-              <a:rPr lang="en-US" sz="2400" dirty="0"/>
-              <a:t>ER Diagram</a:t>
-            </a:r>
-          </a:p>
-          <a:p>
-            <a:r>
-              <a:rPr lang="en-US" sz="2400" dirty="0"/>
-              <a:t>Primary/foreign keys and other constraints</a:t>
-            </a:r>
-          </a:p>
-          <a:p>
-            <a:r>
-              <a:rPr lang="en-US" sz="2400" dirty="0"/>
-              <a:t>Other design choices, if any</a:t>
-            </a:r>
-          </a:p>
-          <a:p>
-            <a:r>
-              <a:rPr lang="en-US" sz="2400" dirty="0">
-                <a:solidFill>
-                  <a:srgbClr val="FF0000"/>
-                </a:solidFill>
-              </a:rPr>
-              <a:t>Delete this slide once above slides are done.</a:t>
-            </a:r>
-          </a:p>
-        </p:txBody>
-      </p:sp>
+        </p:nvPicPr>
+        <p:blipFill>
+          <a:blip r:embed="rId2"/>
+          <a:srcRect/>
+          <a:stretch/>
+        </p:blipFill>
+        <p:spPr>
+          <a:xfrm>
+            <a:off x="792003" y="605313"/>
+            <a:ext cx="10607993" cy="5647372"/>
+          </a:xfrm>
+          <a:ln>
+            <a:solidFill>
+              <a:schemeClr val="tx1"/>
+            </a:solidFill>
+          </a:ln>
+        </p:spPr>
+      </p:pic>
     </p:spTree>
     <p:extLst>
       <p:ext uri="{BB962C8B-B14F-4D97-AF65-F5344CB8AC3E}">
-        <p14:creationId xmlns:p14="http://schemas.microsoft.com/office/powerpoint/2010/main" val="2118205699"/>
+        <p14:creationId xmlns:p14="http://schemas.microsoft.com/office/powerpoint/2010/main" val="3874626660"/>
       </p:ext>
     </p:extLst>
   </p:cSld>
@@ -5032,44 +5083,222 @@
           <a:chExt cx="0" cy="0"/>
         </a:xfrm>
       </p:grpSpPr>
-      <p:pic>
-        <p:nvPicPr>
-          <p:cNvPr id="5" name="Content Placeholder 4" descr="Diagram&#10;&#10;Description automatically generated">
+      <p:sp>
+        <p:nvSpPr>
+          <p:cNvPr id="2" name="Title 1">
             <a:extLst>
               <a:ext uri="{FF2B5EF4-FFF2-40B4-BE49-F238E27FC236}">
-                <a16:creationId xmlns:a16="http://schemas.microsoft.com/office/drawing/2014/main" id="{D06BF12F-DA46-4F34-AEA9-F8A2AABB395F}"/>
+                <a16:creationId xmlns:a16="http://schemas.microsoft.com/office/drawing/2014/main" id="{11C653B0-0659-4862-B0C1-0A4F23A3239C}"/>
               </a:ext>
             </a:extLst>
           </p:cNvPr>
-          <p:cNvPicPr>
-            <a:picLocks noGrp="1" noChangeAspect="1"/>
-          </p:cNvPicPr>
+          <p:cNvSpPr>
+            <a:spLocks noGrp="1"/>
+          </p:cNvSpPr>
+          <p:nvPr>
+            <p:ph type="title"/>
+          </p:nvPr>
+        </p:nvSpPr>
+        <p:spPr/>
+        <p:txBody>
+          <a:bodyPr/>
+          <a:lstStyle/>
+          <a:p>
+            <a:r>
+              <a:rPr lang="en-US" dirty="0"/>
+              <a:t>Primary Keys</a:t>
+            </a:r>
+          </a:p>
+        </p:txBody>
+      </p:sp>
+      <p:sp>
+        <p:nvSpPr>
+          <p:cNvPr id="3" name="Content Placeholder 2">
+            <a:extLst>
+              <a:ext uri="{FF2B5EF4-FFF2-40B4-BE49-F238E27FC236}">
+                <a16:creationId xmlns:a16="http://schemas.microsoft.com/office/drawing/2014/main" id="{AF7BF1D0-B8F3-4663-9BA8-91413E1AB770}"/>
+              </a:ext>
+            </a:extLst>
+          </p:cNvPr>
+          <p:cNvSpPr>
+            <a:spLocks noGrp="1"/>
+          </p:cNvSpPr>
           <p:nvPr>
             <p:ph idx="1"/>
           </p:nvPr>
-        </p:nvPicPr>
-        <p:blipFill>
-          <a:blip r:embed="rId2"/>
-          <a:stretch>
-            <a:fillRect/>
-          </a:stretch>
-        </p:blipFill>
-        <p:spPr>
-          <a:xfrm>
-            <a:off x="792003" y="605313"/>
-            <a:ext cx="10607993" cy="5647373"/>
-          </a:xfrm>
-          <a:ln>
-            <a:solidFill>
-              <a:schemeClr val="tx1"/>
-            </a:solidFill>
-          </a:ln>
-        </p:spPr>
-      </p:pic>
+        </p:nvSpPr>
+        <p:spPr/>
+        <p:txBody>
+          <a:bodyPr>
+            <a:normAutofit lnSpcReduction="10000"/>
+          </a:bodyPr>
+          <a:lstStyle/>
+          <a:p>
+            <a:r>
+              <a:rPr lang="en-US" sz="2400" dirty="0">
+                <a:latin typeface="Courier New" panose="02070309020205020404" pitchFamily="49" charset="0"/>
+                <a:cs typeface="Courier New" panose="02070309020205020404" pitchFamily="49" charset="0"/>
+              </a:rPr>
+              <a:t>supplier</a:t>
+            </a:r>
+            <a:r>
+              <a:rPr lang="en-US" sz="2400" dirty="0"/>
+              <a:t>: PRIMARY KEY (</a:t>
+            </a:r>
+            <a:r>
+              <a:rPr lang="en-US" sz="2400" dirty="0" err="1"/>
+              <a:t>SupplierID</a:t>
+            </a:r>
+            <a:r>
+              <a:rPr lang="en-US" sz="2400" dirty="0"/>
+              <a:t>)</a:t>
+            </a:r>
+          </a:p>
+          <a:p>
+            <a:r>
+              <a:rPr lang="en-US" sz="2400" dirty="0">
+                <a:latin typeface="Courier New" panose="02070309020205020404" pitchFamily="49" charset="0"/>
+                <a:cs typeface="Courier New" panose="02070309020205020404" pitchFamily="49" charset="0"/>
+              </a:rPr>
+              <a:t>subject</a:t>
+            </a:r>
+            <a:r>
+              <a:rPr lang="en-US" sz="2400" dirty="0"/>
+              <a:t>: PRIMARY KEY (</a:t>
+            </a:r>
+            <a:r>
+              <a:rPr lang="en-US" sz="2400" dirty="0" err="1"/>
+              <a:t>SubjectID</a:t>
+            </a:r>
+            <a:r>
+              <a:rPr lang="en-US" sz="2400" dirty="0"/>
+              <a:t>)</a:t>
+            </a:r>
+          </a:p>
+          <a:p>
+            <a:r>
+              <a:rPr lang="en-US" sz="2400" dirty="0">
+                <a:latin typeface="Courier New" panose="02070309020205020404" pitchFamily="49" charset="0"/>
+                <a:cs typeface="Courier New" panose="02070309020205020404" pitchFamily="49" charset="0"/>
+              </a:rPr>
+              <a:t>book</a:t>
+            </a:r>
+            <a:r>
+              <a:rPr lang="en-US" sz="2400" dirty="0"/>
+              <a:t>: PRIMARY KEY (</a:t>
+            </a:r>
+            <a:r>
+              <a:rPr lang="en-US" sz="2400" dirty="0" err="1"/>
+              <a:t>BookID</a:t>
+            </a:r>
+            <a:r>
+              <a:rPr lang="en-US" sz="2400" dirty="0"/>
+              <a:t>)</a:t>
+            </a:r>
+          </a:p>
+          <a:p>
+            <a:r>
+              <a:rPr lang="en-US" sz="2400" dirty="0">
+                <a:latin typeface="Courier New" panose="02070309020205020404" pitchFamily="49" charset="0"/>
+                <a:cs typeface="Courier New" panose="02070309020205020404" pitchFamily="49" charset="0"/>
+              </a:rPr>
+              <a:t>customer</a:t>
+            </a:r>
+            <a:r>
+              <a:rPr lang="en-US" sz="2400" dirty="0"/>
+              <a:t>: PRIMARY KEY (</a:t>
+            </a:r>
+            <a:r>
+              <a:rPr lang="en-US" sz="2400" dirty="0" err="1"/>
+              <a:t>CustomerID</a:t>
+            </a:r>
+            <a:r>
+              <a:rPr lang="en-US" sz="2400" dirty="0"/>
+              <a:t>)</a:t>
+            </a:r>
+          </a:p>
+          <a:p>
+            <a:r>
+              <a:rPr lang="en-US" sz="2400" dirty="0">
+                <a:latin typeface="Courier New" panose="02070309020205020404" pitchFamily="49" charset="0"/>
+                <a:cs typeface="Courier New" panose="02070309020205020404" pitchFamily="49" charset="0"/>
+              </a:rPr>
+              <a:t>employee</a:t>
+            </a:r>
+            <a:r>
+              <a:rPr lang="en-US" sz="2400" dirty="0"/>
+              <a:t>: PRIMARY KEY (</a:t>
+            </a:r>
+            <a:r>
+              <a:rPr lang="en-US" sz="2400" dirty="0" err="1"/>
+              <a:t>EmployeeID</a:t>
+            </a:r>
+            <a:r>
+              <a:rPr lang="en-US" sz="2400" dirty="0"/>
+              <a:t>)</a:t>
+            </a:r>
+          </a:p>
+          <a:p>
+            <a:r>
+              <a:rPr lang="en-US" sz="2400" dirty="0">
+                <a:latin typeface="Courier New" panose="02070309020205020404" pitchFamily="49" charset="0"/>
+                <a:cs typeface="Courier New" panose="02070309020205020404" pitchFamily="49" charset="0"/>
+              </a:rPr>
+              <a:t>shipper</a:t>
+            </a:r>
+            <a:r>
+              <a:rPr lang="en-US" sz="2400" dirty="0"/>
+              <a:t>: PRIMARY KEY (</a:t>
+            </a:r>
+            <a:r>
+              <a:rPr lang="en-US" sz="2400" dirty="0" err="1"/>
+              <a:t>ShipperID</a:t>
+            </a:r>
+            <a:r>
+              <a:rPr lang="en-US" sz="2400" dirty="0"/>
+              <a:t>)</a:t>
+            </a:r>
+          </a:p>
+          <a:p>
+            <a:r>
+              <a:rPr lang="en-US" sz="2400" dirty="0">
+                <a:latin typeface="Courier New" panose="02070309020205020404" pitchFamily="49" charset="0"/>
+                <a:cs typeface="Courier New" panose="02070309020205020404" pitchFamily="49" charset="0"/>
+              </a:rPr>
+              <a:t>orders</a:t>
+            </a:r>
+            <a:r>
+              <a:rPr lang="en-US" sz="2400" dirty="0"/>
+              <a:t>: PRIMARY KEY (</a:t>
+            </a:r>
+            <a:r>
+              <a:rPr lang="en-US" sz="2400" dirty="0" err="1"/>
+              <a:t>OrderID</a:t>
+            </a:r>
+            <a:r>
+              <a:rPr lang="en-US" sz="2400" dirty="0"/>
+              <a:t>)</a:t>
+            </a:r>
+          </a:p>
+          <a:p>
+            <a:r>
+              <a:rPr lang="en-US" sz="2400" dirty="0" err="1">
+                <a:latin typeface="Courier New" panose="02070309020205020404" pitchFamily="49" charset="0"/>
+                <a:cs typeface="Courier New" panose="02070309020205020404" pitchFamily="49" charset="0"/>
+              </a:rPr>
+              <a:t>order_detail</a:t>
+            </a:r>
+            <a:r>
+              <a:rPr lang="en-US" sz="2400" dirty="0"/>
+              <a:t>: No primary key.</a:t>
+            </a:r>
+          </a:p>
+        </p:txBody>
+      </p:sp>
     </p:spTree>
     <p:extLst>
       <p:ext uri="{BB962C8B-B14F-4D97-AF65-F5344CB8AC3E}">
-        <p14:creationId xmlns:p14="http://schemas.microsoft.com/office/powerpoint/2010/main" val="3874626660"/>
+        <p14:creationId xmlns:p14="http://schemas.microsoft.com/office/powerpoint/2010/main" val="2932785064"/>
       </p:ext>
     </p:extLst>
   </p:cSld>
@@ -5101,7 +5330,7 @@
           <p:cNvPr id="2" name="Title 1">
             <a:extLst>
               <a:ext uri="{FF2B5EF4-FFF2-40B4-BE49-F238E27FC236}">
-                <a16:creationId xmlns:a16="http://schemas.microsoft.com/office/drawing/2014/main" id="{11C653B0-0659-4862-B0C1-0A4F23A3239C}"/>
+                <a16:creationId xmlns:a16="http://schemas.microsoft.com/office/drawing/2014/main" id="{57C7652C-AED1-4CC9-8162-4DB081039FA4}"/>
               </a:ext>
             </a:extLst>
           </p:cNvPr>
@@ -5119,7 +5348,7 @@
           <a:p>
             <a:r>
               <a:rPr lang="en-US" dirty="0"/>
-              <a:t>Primary Keys</a:t>
+              <a:t>Foreign Keys</a:t>
             </a:r>
           </a:p>
         </p:txBody>
@@ -5129,7 +5358,7 @@
           <p:cNvPr id="3" name="Content Placeholder 2">
             <a:extLst>
               <a:ext uri="{FF2B5EF4-FFF2-40B4-BE49-F238E27FC236}">
-                <a16:creationId xmlns:a16="http://schemas.microsoft.com/office/drawing/2014/main" id="{AF7BF1D0-B8F3-4663-9BA8-91413E1AB770}"/>
+                <a16:creationId xmlns:a16="http://schemas.microsoft.com/office/drawing/2014/main" id="{1D006C83-3CAB-4449-AE3D-91FADEE3B6DF}"/>
               </a:ext>
             </a:extLst>
           </p:cNvPr>
@@ -5143,51 +5372,9 @@
         <p:spPr/>
         <p:txBody>
           <a:bodyPr>
-            <a:normAutofit lnSpcReduction="10000"/>
+            <a:normAutofit fontScale="92500" lnSpcReduction="10000"/>
           </a:bodyPr>
           <a:lstStyle/>
-          <a:p>
-            <a:r>
-              <a:rPr lang="en-US" sz="2400" dirty="0">
-                <a:latin typeface="Courier New" panose="02070309020205020404" pitchFamily="49" charset="0"/>
-                <a:cs typeface="Courier New" panose="02070309020205020404" pitchFamily="49" charset="0"/>
-              </a:rPr>
-              <a:t>supplier</a:t>
-            </a:r>
-            <a:r>
-              <a:rPr lang="en-US" sz="2400" dirty="0"/>
-              <a:t>: PRIMARY KEY (</a:t>
-            </a:r>
-            <a:r>
-              <a:rPr lang="en-US" sz="2400" dirty="0" err="1"/>
-              <a:t>SupplierID</a:t>
-            </a:r>
-            <a:r>
-              <a:rPr lang="en-US" sz="2400" dirty="0"/>
-              <a:t>)</a:t>
-            </a:r>
-          </a:p>
-          <a:p>
-            <a:r>
-              <a:rPr lang="en-US" sz="2400" dirty="0">
-                <a:latin typeface="Courier New" panose="02070309020205020404" pitchFamily="49" charset="0"/>
-                <a:cs typeface="Courier New" panose="02070309020205020404" pitchFamily="49" charset="0"/>
-              </a:rPr>
-              <a:t>subject</a:t>
-            </a:r>
-            <a:r>
-              <a:rPr lang="en-US" sz="2400" dirty="0"/>
-              <a:t>: PRIMARY KEY (</a:t>
-            </a:r>
-            <a:r>
-              <a:rPr lang="en-US" sz="2400" dirty="0" err="1"/>
-              <a:t>SubjectID</a:t>
-            </a:r>
-            <a:r>
-              <a:rPr lang="en-US" sz="2400" dirty="0"/>
-              <a:t>)</a:t>
-            </a:r>
-          </a:p>
           <a:p>
             <a:r>
               <a:rPr lang="en-US" sz="2400" dirty="0">
@@ -5198,77 +5385,52 @@
             </a:r>
             <a:r>
               <a:rPr lang="en-US" sz="2400" dirty="0"/>
-              <a:t>: PRIMARY KEY (</a:t>
-            </a:r>
-            <a:r>
-              <a:rPr lang="en-US" sz="2400" dirty="0" err="1"/>
-              <a:t>BookID</a:t>
-            </a:r>
-            <a:r>
-              <a:rPr lang="en-US" sz="2400" dirty="0"/>
+              <a:t>:</a:t>
+            </a:r>
+          </a:p>
+          <a:p>
+            <a:pPr lvl="1"/>
+            <a:r>
+              <a:rPr lang="en-US" sz="2200" dirty="0"/>
+              <a:t>FOREIGN KEY (</a:t>
+            </a:r>
+            <a:r>
+              <a:rPr lang="en-US" sz="2200" dirty="0" err="1"/>
+              <a:t>SupplierID</a:t>
+            </a:r>
+            <a:r>
+              <a:rPr lang="en-US" sz="2200" dirty="0"/>
+              <a:t>) REFERENCES supplier(</a:t>
+            </a:r>
+            <a:r>
+              <a:rPr lang="en-US" sz="2200" dirty="0" err="1"/>
+              <a:t>SupplierID</a:t>
+            </a:r>
+            <a:r>
+              <a:rPr lang="en-US" sz="2200" dirty="0"/>
               <a:t>)</a:t>
             </a:r>
           </a:p>
           <a:p>
-            <a:r>
-              <a:rPr lang="en-US" sz="2400" dirty="0">
-                <a:latin typeface="Courier New" panose="02070309020205020404" pitchFamily="49" charset="0"/>
-                <a:cs typeface="Courier New" panose="02070309020205020404" pitchFamily="49" charset="0"/>
-              </a:rPr>
-              <a:t>customer</a:t>
-            </a:r>
-            <a:r>
-              <a:rPr lang="en-US" sz="2400" dirty="0"/>
-              <a:t>: PRIMARY KEY (</a:t>
-            </a:r>
-            <a:r>
-              <a:rPr lang="en-US" sz="2400" dirty="0" err="1"/>
-              <a:t>CustomerID</a:t>
-            </a:r>
-            <a:r>
-              <a:rPr lang="en-US" sz="2400" dirty="0"/>
-              <a:t>)</a:t>
-            </a:r>
-          </a:p>
-          <a:p>
-            <a:r>
-              <a:rPr lang="en-US" sz="2400" dirty="0">
-                <a:latin typeface="Courier New" panose="02070309020205020404" pitchFamily="49" charset="0"/>
-                <a:cs typeface="Courier New" panose="02070309020205020404" pitchFamily="49" charset="0"/>
-              </a:rPr>
-              <a:t>employee</a:t>
-            </a:r>
-            <a:r>
-              <a:rPr lang="en-US" sz="2400" dirty="0"/>
-              <a:t>: PRIMARY KEY (</a:t>
-            </a:r>
-            <a:r>
-              <a:rPr lang="en-US" sz="2400" dirty="0" err="1"/>
-              <a:t>EmployeeID</a:t>
-            </a:r>
-            <a:r>
-              <a:rPr lang="en-US" sz="2400" dirty="0"/>
-              <a:t>)</a:t>
-            </a:r>
-          </a:p>
-          <a:p>
-            <a:r>
-              <a:rPr lang="en-US" sz="2400" dirty="0">
-                <a:latin typeface="Courier New" panose="02070309020205020404" pitchFamily="49" charset="0"/>
-                <a:cs typeface="Courier New" panose="02070309020205020404" pitchFamily="49" charset="0"/>
-              </a:rPr>
-              <a:t>shipper</a:t>
-            </a:r>
-            <a:r>
-              <a:rPr lang="en-US" sz="2400" dirty="0"/>
-              <a:t>: PRIMARY KEY (</a:t>
-            </a:r>
-            <a:r>
-              <a:rPr lang="en-US" sz="2400" dirty="0" err="1"/>
-              <a:t>ShipperID</a:t>
-            </a:r>
-            <a:r>
-              <a:rPr lang="en-US" sz="2400" dirty="0"/>
+            <a:pPr lvl="1"/>
+            <a:r>
+              <a:rPr lang="en-US" sz="2200" dirty="0"/>
+              <a:t>FOREIGN KEY (</a:t>
+            </a:r>
+            <a:r>
+              <a:rPr lang="en-US" sz="2200" dirty="0" err="1"/>
+              <a:t>SubjectID</a:t>
+            </a:r>
+            <a:r>
+              <a:rPr lang="en-US" sz="2200" dirty="0"/>
+              <a:t>) REFERENCES subject(</a:t>
+            </a:r>
+            <a:r>
+              <a:rPr lang="en-US" sz="2200" dirty="0" err="1"/>
+              <a:t>SubjectID</a:t>
+            </a:r>
+            <a:r>
+              <a:rPr lang="en-US" sz="2200" dirty="0"/>
               <a:t>)</a:t>
             </a:r>
           </a:p>
@@ -5282,14 +5444,75 @@
             </a:r>
             <a:r>
               <a:rPr lang="en-US" sz="2400" dirty="0"/>
-              <a:t>: PRIMARY KEY (</a:t>
-            </a:r>
-            <a:r>
-              <a:rPr lang="en-US" sz="2400" dirty="0" err="1"/>
-              <a:t>OrderID</a:t>
-            </a:r>
-            <a:r>
-              <a:rPr lang="en-US" sz="2400" dirty="0"/>
+              <a:t>:</a:t>
+            </a:r>
+          </a:p>
+          <a:p>
+            <a:pPr lvl="1"/>
+            <a:r>
+              <a:rPr lang="en-US" sz="2200" dirty="0"/>
+              <a:t>FOREIGN KEY (</a:t>
+            </a:r>
+            <a:r>
+              <a:rPr lang="en-US" sz="2200" dirty="0" err="1"/>
+              <a:t>CustomerID</a:t>
+            </a:r>
+            <a:r>
+              <a:rPr lang="en-US" sz="2200" dirty="0"/>
+              <a:t>) REFERENCES customer(</a:t>
+            </a:r>
+            <a:r>
+              <a:rPr lang="en-US" sz="2200" dirty="0" err="1"/>
+              <a:t>CustomerID</a:t>
+            </a:r>
+            <a:r>
+              <a:rPr lang="en-US" sz="2200" dirty="0"/>
+              <a:t>)</a:t>
+            </a:r>
+          </a:p>
+          <a:p>
+            <a:pPr lvl="1"/>
+            <a:r>
+              <a:rPr lang="en-US" sz="2200" dirty="0"/>
+              <a:t>FOREIGN KEY (</a:t>
+            </a:r>
+            <a:r>
+              <a:rPr lang="en-US" sz="2200" dirty="0" err="1"/>
+              <a:t>EmployeeID</a:t>
+            </a:r>
+            <a:r>
+              <a:rPr lang="en-US" sz="2200" dirty="0"/>
+              <a:t>) REFERENCES employee(</a:t>
+            </a:r>
+            <a:r>
+              <a:rPr lang="en-US" sz="2200" dirty="0" err="1"/>
+              <a:t>EmployeeID</a:t>
+            </a:r>
+            <a:r>
+              <a:rPr lang="en-US" sz="2200" dirty="0"/>
+              <a:t>)</a:t>
+            </a:r>
+          </a:p>
+          <a:p>
+            <a:pPr lvl="1"/>
+            <a:r>
+              <a:rPr lang="en-US" sz="2200" dirty="0"/>
+              <a:t>FOREIGN KEY (</a:t>
+            </a:r>
+            <a:r>
+              <a:rPr lang="en-US" sz="2200" dirty="0" err="1"/>
+              <a:t>ShipperID</a:t>
+            </a:r>
+            <a:r>
+              <a:rPr lang="en-US" sz="2200" dirty="0"/>
+              <a:t>) REFERENCES employee(</a:t>
+            </a:r>
+            <a:r>
+              <a:rPr lang="en-US" sz="2200" dirty="0" err="1"/>
+              <a:t>ShipperID</a:t>
+            </a:r>
+            <a:r>
+              <a:rPr lang="en-US" sz="2200" dirty="0"/>
               <a:t>)</a:t>
             </a:r>
           </a:p>
@@ -5303,7 +5526,53 @@
             </a:r>
             <a:r>
               <a:rPr lang="en-US" sz="2400" dirty="0"/>
-              <a:t>: No primary key.</a:t>
+              <a:t>:</a:t>
+            </a:r>
+          </a:p>
+          <a:p>
+            <a:pPr lvl="1"/>
+            <a:r>
+              <a:rPr lang="en-US" sz="2200" dirty="0"/>
+              <a:t>FOREIGN KEY (</a:t>
+            </a:r>
+            <a:r>
+              <a:rPr lang="en-US" sz="2200" dirty="0" err="1"/>
+              <a:t>BookID</a:t>
+            </a:r>
+            <a:r>
+              <a:rPr lang="en-US" sz="2200" dirty="0"/>
+              <a:t>) REFERENCES book(</a:t>
+            </a:r>
+            <a:r>
+              <a:rPr lang="en-US" sz="2200" dirty="0" err="1"/>
+              <a:t>BookID</a:t>
+            </a:r>
+            <a:r>
+              <a:rPr lang="en-US" sz="2200" dirty="0"/>
+              <a:t>)</a:t>
+            </a:r>
+          </a:p>
+          <a:p>
+            <a:pPr lvl="1"/>
+            <a:r>
+              <a:rPr lang="en-US" sz="2200" dirty="0"/>
+              <a:t>FOREIGN KEY (</a:t>
+            </a:r>
+            <a:r>
+              <a:rPr lang="en-US" sz="2200" dirty="0" err="1"/>
+              <a:t>OrderID</a:t>
+            </a:r>
+            <a:r>
+              <a:rPr lang="en-US" sz="2200" dirty="0"/>
+              <a:t>) REFERENCES orders(</a:t>
+            </a:r>
+            <a:r>
+              <a:rPr lang="en-US" sz="2200" dirty="0" err="1"/>
+              <a:t>OrderID</a:t>
+            </a:r>
+            <a:r>
+              <a:rPr lang="en-US" sz="2200" dirty="0"/>
+              <a:t>)</a:t>
             </a:r>
           </a:p>
         </p:txBody>
@@ -5311,7 +5580,7 @@
     </p:spTree>
     <p:extLst>
       <p:ext uri="{BB962C8B-B14F-4D97-AF65-F5344CB8AC3E}">
-        <p14:creationId xmlns:p14="http://schemas.microsoft.com/office/powerpoint/2010/main" val="2932785064"/>
+        <p14:creationId xmlns:p14="http://schemas.microsoft.com/office/powerpoint/2010/main" val="1057704573"/>
       </p:ext>
     </p:extLst>
   </p:cSld>
@@ -5361,7 +5630,7 @@
           <a:p>
             <a:r>
               <a:rPr lang="en-US" dirty="0"/>
-              <a:t>Foreign Keys</a:t>
+              <a:t>1:N relationship type</a:t>
             </a:r>
           </a:p>
         </p:txBody>
@@ -5385,7 +5654,7 @@
         <p:spPr/>
         <p:txBody>
           <a:bodyPr>
-            <a:normAutofit lnSpcReduction="10000"/>
+            <a:normAutofit/>
           </a:bodyPr>
           <a:lstStyle/>
           <a:p>
@@ -5394,7 +5663,7 @@
                 <a:latin typeface="Courier New" panose="02070309020205020404" pitchFamily="49" charset="0"/>
                 <a:cs typeface="Courier New" panose="02070309020205020404" pitchFamily="49" charset="0"/>
               </a:rPr>
-              <a:t>book</a:t>
+              <a:t>order</a:t>
             </a:r>
             <a:r>
               <a:rPr lang="en-US" sz="2400" dirty="0"/>
@@ -5404,47 +5673,32 @@
           <a:p>
             <a:pPr lvl="1"/>
             <a:r>
-              <a:rPr lang="en-US" sz="2200" dirty="0"/>
-              <a:t>FOREIGN KEY (</a:t>
-            </a:r>
-            <a:r>
-              <a:rPr lang="en-US" sz="2200" dirty="0" err="1"/>
-              <a:t>SupplierID</a:t>
-            </a:r>
-            <a:r>
-              <a:rPr lang="en-US" sz="2200" dirty="0"/>
-              <a:t>) REFERENCES supplier(</a:t>
-            </a:r>
-            <a:r>
-              <a:rPr lang="en-US" sz="2200" dirty="0" err="1"/>
-              <a:t>SupplierID</a:t>
-            </a:r>
-            <a:r>
-              <a:rPr lang="en-US" sz="2200" dirty="0"/>
-              <a:t>)</a:t>
-            </a:r>
+              <a:rPr lang="en-US" sz="2200" dirty="0">
+                <a:latin typeface="Courier New" panose="02070309020205020404" pitchFamily="49" charset="0"/>
+                <a:cs typeface="Courier New" panose="02070309020205020404" pitchFamily="49" charset="0"/>
+              </a:rPr>
+              <a:t>customer</a:t>
+            </a:r>
+            <a:endParaRPr lang="en-US" sz="2200" dirty="0"/>
           </a:p>
           <a:p>
             <a:pPr lvl="1"/>
             <a:r>
-              <a:rPr lang="en-US" sz="2200" dirty="0"/>
-              <a:t>FOREIGN KEY (</a:t>
-            </a:r>
-            <a:r>
-              <a:rPr lang="en-US" sz="2200" dirty="0" err="1"/>
-              <a:t>SubjectID</a:t>
-            </a:r>
-            <a:r>
-              <a:rPr lang="en-US" sz="2200" dirty="0"/>
-              <a:t>) REFERENCES subject(</a:t>
-            </a:r>
-            <a:r>
-              <a:rPr lang="en-US" sz="2200" dirty="0" err="1"/>
-              <a:t>SubjectID</a:t>
-            </a:r>
-            <a:r>
-              <a:rPr lang="en-US" sz="2200" dirty="0"/>
-              <a:t>)</a:t>
+              <a:rPr lang="en-US" sz="2200" dirty="0">
+                <a:latin typeface="Courier New" panose="02070309020205020404" pitchFamily="49" charset="0"/>
+                <a:cs typeface="Courier New" panose="02070309020205020404" pitchFamily="49" charset="0"/>
+              </a:rPr>
+              <a:t>employee</a:t>
+            </a:r>
+          </a:p>
+          <a:p>
+            <a:pPr lvl="1"/>
+            <a:r>
+              <a:rPr lang="en-US" sz="2200" dirty="0">
+                <a:latin typeface="Courier New" panose="02070309020205020404" pitchFamily="49" charset="0"/>
+                <a:cs typeface="Courier New" panose="02070309020205020404" pitchFamily="49" charset="0"/>
+              </a:rPr>
+              <a:t>shipper</a:t>
             </a:r>
           </a:p>
           <a:p>
@@ -5453,116 +5707,27 @@
                 <a:latin typeface="Courier New" panose="02070309020205020404" pitchFamily="49" charset="0"/>
                 <a:cs typeface="Courier New" panose="02070309020205020404" pitchFamily="49" charset="0"/>
               </a:rPr>
-              <a:t>orders</a:t>
-            </a:r>
-            <a:r>
-              <a:rPr lang="en-US" sz="2400" dirty="0"/>
-              <a:t>:</a:t>
+              <a:t>book:</a:t>
             </a:r>
           </a:p>
           <a:p>
             <a:pPr lvl="1"/>
             <a:r>
-              <a:rPr lang="en-US" sz="2200" dirty="0"/>
-              <a:t>FOREIGN KEY (</a:t>
-            </a:r>
-            <a:r>
-              <a:rPr lang="en-US" sz="2200" dirty="0" err="1"/>
-              <a:t>CustomerID</a:t>
-            </a:r>
-            <a:r>
-              <a:rPr lang="en-US" sz="2200" dirty="0"/>
-              <a:t>) REFERENCES customer(</a:t>
-            </a:r>
-            <a:r>
-              <a:rPr lang="en-US" sz="2200" dirty="0" err="1"/>
-              <a:t>CustomerID</a:t>
-            </a:r>
-            <a:r>
-              <a:rPr lang="en-US" sz="2200" dirty="0"/>
-              <a:t>)</a:t>
-            </a:r>
-          </a:p>
-          <a:p>
-            <a:pPr lvl="1"/>
-            <a:r>
-              <a:rPr lang="en-US" sz="2200" dirty="0"/>
-              <a:t>FOREIGN KEY (</a:t>
-            </a:r>
-            <a:r>
-              <a:rPr lang="en-US" sz="2200" dirty="0" err="1"/>
-              <a:t>EmployeeID</a:t>
-            </a:r>
-            <a:r>
-              <a:rPr lang="en-US" sz="2200" dirty="0"/>
-              <a:t>) REFERENCES employee(</a:t>
-            </a:r>
-            <a:r>
-              <a:rPr lang="en-US" sz="2200" dirty="0" err="1"/>
-              <a:t>EmployeeID</a:t>
-            </a:r>
-            <a:r>
-              <a:rPr lang="en-US" sz="2200" dirty="0"/>
-              <a:t>)</a:t>
-            </a:r>
-          </a:p>
-          <a:p>
-            <a:r>
-              <a:rPr lang="en-US" sz="2400" dirty="0" err="1">
+              <a:rPr lang="en-US" sz="2200" dirty="0">
                 <a:latin typeface="Courier New" panose="02070309020205020404" pitchFamily="49" charset="0"/>
                 <a:cs typeface="Courier New" panose="02070309020205020404" pitchFamily="49" charset="0"/>
               </a:rPr>
-              <a:t>order_detail</a:t>
-            </a:r>
-            <a:r>
-              <a:rPr lang="en-US" sz="2400" dirty="0"/>
-              <a:t>:</a:t>
+              <a:t>subject</a:t>
             </a:r>
           </a:p>
           <a:p>
             <a:pPr lvl="1"/>
             <a:r>
-              <a:rPr lang="en-US" sz="2200" dirty="0"/>
-              <a:t>FOREIGN KEY (</a:t>
-            </a:r>
-            <a:r>
-              <a:rPr lang="en-US" sz="2200" dirty="0" err="1"/>
-              <a:t>BookID</a:t>
-            </a:r>
-            <a:r>
-              <a:rPr lang="en-US" sz="2200" dirty="0"/>
-              <a:t>) REFERENCES book(</a:t>
-            </a:r>
-            <a:r>
-              <a:rPr lang="en-US" sz="2200" dirty="0" err="1"/>
-              <a:t>BookID</a:t>
-            </a:r>
-            <a:r>
-              <a:rPr lang="en-US" sz="2200" dirty="0"/>
-              <a:t>)</a:t>
-            </a:r>
-          </a:p>
-          <a:p>
-            <a:pPr lvl="1"/>
-            <a:r>
-              <a:rPr lang="en-US" sz="2200" dirty="0"/>
-              <a:t>FOREIGN KEY (</a:t>
-            </a:r>
-            <a:r>
-              <a:rPr lang="en-US" sz="2200" dirty="0" err="1"/>
-              <a:t>OrderID</a:t>
-            </a:r>
-            <a:r>
-              <a:rPr lang="en-US" sz="2200" dirty="0"/>
-              <a:t>) REFERENCES orders(</a:t>
-            </a:r>
-            <a:r>
-              <a:rPr lang="en-US" sz="2200" dirty="0" err="1"/>
-              <a:t>OrderID</a:t>
-            </a:r>
-            <a:r>
-              <a:rPr lang="en-US" sz="2200" dirty="0"/>
-              <a:t>)</a:t>
+              <a:rPr lang="en-US" sz="2200" dirty="0">
+                <a:latin typeface="Courier New" panose="02070309020205020404" pitchFamily="49" charset="0"/>
+                <a:cs typeface="Courier New" panose="02070309020205020404" pitchFamily="49" charset="0"/>
+              </a:rPr>
+              <a:t>supplier</a:t>
             </a:r>
           </a:p>
         </p:txBody>
@@ -5570,7 +5735,7 @@
     </p:spTree>
     <p:extLst>
       <p:ext uri="{BB962C8B-B14F-4D97-AF65-F5344CB8AC3E}">
-        <p14:creationId xmlns:p14="http://schemas.microsoft.com/office/powerpoint/2010/main" val="1057704573"/>
+        <p14:creationId xmlns:p14="http://schemas.microsoft.com/office/powerpoint/2010/main" val="3289301914"/>
       </p:ext>
     </p:extLst>
   </p:cSld>
@@ -5581,6 +5746,167 @@
 </file>
 
 <file path=ppt/slides/slide6.xml><?xml version="1.0" encoding="utf-8"?>
+<p:sld xmlns:a="http://schemas.openxmlformats.org/drawingml/2006/main" xmlns:r="http://schemas.openxmlformats.org/officeDocument/2006/relationships" xmlns:p="http://schemas.openxmlformats.org/presentationml/2006/main">
+  <p:cSld>
+    <p:spTree>
+      <p:nvGrpSpPr>
+        <p:cNvPr id="1" name=""/>
+        <p:cNvGrpSpPr/>
+        <p:nvPr/>
+      </p:nvGrpSpPr>
+      <p:grpSpPr>
+        <a:xfrm>
+          <a:off x="0" y="0"/>
+          <a:ext cx="0" cy="0"/>
+          <a:chOff x="0" y="0"/>
+          <a:chExt cx="0" cy="0"/>
+        </a:xfrm>
+      </p:grpSpPr>
+      <p:sp>
+        <p:nvSpPr>
+          <p:cNvPr id="2" name="Title 1">
+            <a:extLst>
+              <a:ext uri="{FF2B5EF4-FFF2-40B4-BE49-F238E27FC236}">
+                <a16:creationId xmlns:a16="http://schemas.microsoft.com/office/drawing/2014/main" id="{57C7652C-AED1-4CC9-8162-4DB081039FA4}"/>
+              </a:ext>
+            </a:extLst>
+          </p:cNvPr>
+          <p:cNvSpPr>
+            <a:spLocks noGrp="1"/>
+          </p:cNvSpPr>
+          <p:nvPr>
+            <p:ph type="title"/>
+          </p:nvPr>
+        </p:nvSpPr>
+        <p:spPr/>
+        <p:txBody>
+          <a:bodyPr/>
+          <a:lstStyle/>
+          <a:p>
+            <a:r>
+              <a:rPr lang="en-US" dirty="0"/>
+              <a:t>Others</a:t>
+            </a:r>
+          </a:p>
+        </p:txBody>
+      </p:sp>
+      <p:sp>
+        <p:nvSpPr>
+          <p:cNvPr id="3" name="Content Placeholder 2">
+            <a:extLst>
+              <a:ext uri="{FF2B5EF4-FFF2-40B4-BE49-F238E27FC236}">
+                <a16:creationId xmlns:a16="http://schemas.microsoft.com/office/drawing/2014/main" id="{1D006C83-3CAB-4449-AE3D-91FADEE3B6DF}"/>
+              </a:ext>
+            </a:extLst>
+          </p:cNvPr>
+          <p:cNvSpPr>
+            <a:spLocks noGrp="1"/>
+          </p:cNvSpPr>
+          <p:nvPr>
+            <p:ph idx="1"/>
+          </p:nvPr>
+        </p:nvSpPr>
+        <p:spPr/>
+        <p:txBody>
+          <a:bodyPr>
+            <a:normAutofit/>
+          </a:bodyPr>
+          <a:lstStyle/>
+          <a:p>
+            <a:r>
+              <a:rPr lang="en-US" sz="2400" dirty="0"/>
+              <a:t>M:N relationship type</a:t>
+            </a:r>
+          </a:p>
+          <a:p>
+            <a:pPr lvl="1"/>
+            <a:r>
+              <a:rPr lang="en-US" sz="2200" dirty="0" err="1">
+                <a:latin typeface="Courier New" panose="02070309020205020404" pitchFamily="49" charset="0"/>
+                <a:cs typeface="Courier New" panose="02070309020205020404" pitchFamily="49" charset="0"/>
+              </a:rPr>
+              <a:t>order_detail</a:t>
+            </a:r>
+            <a:r>
+              <a:rPr lang="en-US" sz="2200" dirty="0">
+                <a:latin typeface="Courier New" panose="02070309020205020404" pitchFamily="49" charset="0"/>
+                <a:cs typeface="Courier New" panose="02070309020205020404" pitchFamily="49" charset="0"/>
+              </a:rPr>
+              <a:t> ↔ book</a:t>
+            </a:r>
+          </a:p>
+          <a:p>
+            <a:r>
+              <a:rPr lang="en-US" sz="2400" dirty="0"/>
+              <a:t>Weak entity (</a:t>
+            </a:r>
+            <a:r>
+              <a:rPr lang="en-US" sz="2400" dirty="0" err="1">
+                <a:latin typeface="Courier New" panose="02070309020205020404" pitchFamily="49" charset="0"/>
+                <a:cs typeface="Courier New" panose="02070309020205020404" pitchFamily="49" charset="0"/>
+              </a:rPr>
+              <a:t>order_detail</a:t>
+            </a:r>
+            <a:r>
+              <a:rPr lang="en-US" sz="2400" dirty="0"/>
+              <a:t>)</a:t>
+            </a:r>
+          </a:p>
+          <a:p>
+            <a:pPr lvl="1"/>
+            <a:r>
+              <a:rPr lang="en-US" sz="2200" dirty="0"/>
+              <a:t>Relies on </a:t>
+            </a:r>
+            <a:r>
+              <a:rPr lang="en-US" sz="2200" dirty="0">
+                <a:latin typeface="Courier New" panose="02070309020205020404" pitchFamily="49" charset="0"/>
+                <a:cs typeface="Courier New" panose="02070309020205020404" pitchFamily="49" charset="0"/>
+              </a:rPr>
+              <a:t>order</a:t>
+            </a:r>
+            <a:r>
+              <a:rPr lang="en-US" sz="2200" dirty="0"/>
+              <a:t> for identification</a:t>
+            </a:r>
+          </a:p>
+          <a:p>
+            <a:pPr lvl="1"/>
+            <a:r>
+              <a:rPr lang="en-US" sz="2200" dirty="0">
+                <a:latin typeface="Courier New" panose="02070309020205020404" pitchFamily="49" charset="0"/>
+                <a:cs typeface="Courier New" panose="02070309020205020404" pitchFamily="49" charset="0"/>
+              </a:rPr>
+              <a:t>book</a:t>
+            </a:r>
+            <a:r>
+              <a:rPr lang="en-US" sz="2200" dirty="0"/>
+              <a:t> does not provide identification. Therefore, it has only 1 identifying relationship </a:t>
+            </a:r>
+          </a:p>
+          <a:p>
+            <a:pPr lvl="1"/>
+            <a:endParaRPr lang="en-US" sz="2200" dirty="0">
+              <a:latin typeface="Courier New" panose="02070309020205020404" pitchFamily="49" charset="0"/>
+              <a:cs typeface="Courier New" panose="02070309020205020404" pitchFamily="49" charset="0"/>
+            </a:endParaRPr>
+          </a:p>
+        </p:txBody>
+      </p:sp>
+    </p:spTree>
+    <p:extLst>
+      <p:ext uri="{BB962C8B-B14F-4D97-AF65-F5344CB8AC3E}">
+        <p14:creationId xmlns:p14="http://schemas.microsoft.com/office/powerpoint/2010/main" val="1424483481"/>
+      </p:ext>
+    </p:extLst>
+  </p:cSld>
+  <p:clrMapOvr>
+    <a:masterClrMapping/>
+  </p:clrMapOvr>
+</p:sld>
+</file>
+
+<file path=ppt/slides/slide7.xml><?xml version="1.0" encoding="utf-8"?>
 <p:sld xmlns:a="http://schemas.openxmlformats.org/drawingml/2006/main" xmlns:r="http://schemas.openxmlformats.org/officeDocument/2006/relationships" xmlns:p="http://schemas.openxmlformats.org/presentationml/2006/main">
   <p:cSld>
     <p:spTree>
@@ -5640,7 +5966,7 @@
 </p:sld>
 </file>
 
-<file path=ppt/slides/slide7.xml><?xml version="1.0" encoding="utf-8"?>
+<file path=ppt/slides/slide8.xml><?xml version="1.0" encoding="utf-8"?>
 <p:sld xmlns:a="http://schemas.openxmlformats.org/drawingml/2006/main" xmlns:r="http://schemas.openxmlformats.org/officeDocument/2006/relationships" xmlns:p="http://schemas.openxmlformats.org/presentationml/2006/main">
   <p:cSld>
     <p:spTree>
@@ -5773,7 +6099,7 @@
 </p:sld>
 </file>
 
-<file path=ppt/slides/slide8.xml><?xml version="1.0" encoding="utf-8"?>
+<file path=ppt/slides/slide9.xml><?xml version="1.0" encoding="utf-8"?>
 <p:sld xmlns:a="http://schemas.openxmlformats.org/drawingml/2006/main" xmlns:r="http://schemas.openxmlformats.org/officeDocument/2006/relationships" xmlns:p="http://schemas.openxmlformats.org/presentationml/2006/main">
   <p:cSld>
     <p:spTree>
@@ -5824,103 +6150,6 @@
     <p:extLst>
       <p:ext uri="{BB962C8B-B14F-4D97-AF65-F5344CB8AC3E}">
         <p14:creationId xmlns:p14="http://schemas.microsoft.com/office/powerpoint/2010/main" val="3284229085"/>
-      </p:ext>
-    </p:extLst>
-  </p:cSld>
-  <p:clrMapOvr>
-    <a:masterClrMapping/>
-  </p:clrMapOvr>
-</p:sld>
-</file>
-
-<file path=ppt/slides/slide9.xml><?xml version="1.0" encoding="utf-8"?>
-<p:sld xmlns:a="http://schemas.openxmlformats.org/drawingml/2006/main" xmlns:r="http://schemas.openxmlformats.org/officeDocument/2006/relationships" xmlns:p="http://schemas.openxmlformats.org/presentationml/2006/main">
-  <p:cSld>
-    <p:spTree>
-      <p:nvGrpSpPr>
-        <p:cNvPr id="1" name=""/>
-        <p:cNvGrpSpPr/>
-        <p:nvPr/>
-      </p:nvGrpSpPr>
-      <p:grpSpPr>
-        <a:xfrm>
-          <a:off x="0" y="0"/>
-          <a:ext cx="0" cy="0"/>
-          <a:chOff x="0" y="0"/>
-          <a:chExt cx="0" cy="0"/>
-        </a:xfrm>
-      </p:grpSpPr>
-      <p:sp>
-        <p:nvSpPr>
-          <p:cNvPr id="2" name="Title 1">
-            <a:extLst>
-              <a:ext uri="{FF2B5EF4-FFF2-40B4-BE49-F238E27FC236}">
-                <a16:creationId xmlns:a16="http://schemas.microsoft.com/office/drawing/2014/main" id="{3BDBC1AB-A63D-40DE-878A-BED9F6D28E1D}"/>
-              </a:ext>
-            </a:extLst>
-          </p:cNvPr>
-          <p:cNvSpPr>
-            <a:spLocks noGrp="1"/>
-          </p:cNvSpPr>
-          <p:nvPr>
-            <p:ph type="title"/>
-          </p:nvPr>
-        </p:nvSpPr>
-        <p:spPr/>
-        <p:txBody>
-          <a:bodyPr/>
-          <a:lstStyle/>
-          <a:p>
-            <a:r>
-              <a:rPr lang="en-US" dirty="0"/>
-              <a:t>DatabaseGui.java</a:t>
-            </a:r>
-          </a:p>
-        </p:txBody>
-      </p:sp>
-      <p:sp>
-        <p:nvSpPr>
-          <p:cNvPr id="3" name="Content Placeholder 2">
-            <a:extLst>
-              <a:ext uri="{FF2B5EF4-FFF2-40B4-BE49-F238E27FC236}">
-                <a16:creationId xmlns:a16="http://schemas.microsoft.com/office/drawing/2014/main" id="{E4D8D43C-BACC-47CE-BF77-00C22AF84C52}"/>
-              </a:ext>
-            </a:extLst>
-          </p:cNvPr>
-          <p:cNvSpPr>
-            <a:spLocks noGrp="1"/>
-          </p:cNvSpPr>
-          <p:nvPr>
-            <p:ph idx="1"/>
-          </p:nvPr>
-        </p:nvSpPr>
-        <p:spPr/>
-        <p:txBody>
-          <a:bodyPr>
-            <a:normAutofit/>
-          </a:bodyPr>
-          <a:lstStyle/>
-          <a:p>
-            <a:r>
-              <a:rPr lang="en-US" sz="2400" dirty="0"/>
-              <a:t>DatabaseGui.java is our most complex class, defining the look and frontside functionality of the application.</a:t>
-            </a:r>
-          </a:p>
-          <a:p>
-            <a:r>
-              <a:rPr lang="en-US" sz="2400" dirty="0"/>
-              <a:t>The user interface was developed using Java’s Swing library.</a:t>
-            </a:r>
-          </a:p>
-          <a:p>
-            <a:endParaRPr lang="en-US" sz="2400" dirty="0"/>
-          </a:p>
-        </p:txBody>
-      </p:sp>
-    </p:spTree>
-    <p:extLst>
-      <p:ext uri="{BB962C8B-B14F-4D97-AF65-F5344CB8AC3E}">
-        <p14:creationId xmlns:p14="http://schemas.microsoft.com/office/powerpoint/2010/main" val="1225234224"/>
       </p:ext>
     </p:extLst>
   </p:cSld>
@@ -6207,6 +6436,24 @@
 </file>
 
 <file path=customXml/item1.xml><?xml version="1.0" encoding="utf-8"?>
+<p:properties xmlns:p="http://schemas.microsoft.com/office/2006/metadata/properties" xmlns:xsi="http://www.w3.org/2001/XMLSchema-instance" xmlns:pc="http://schemas.microsoft.com/office/infopath/2007/PartnerControls">
+  <documentManagement>
+    <Status xmlns="71af3243-3dd4-4a8d-8c0d-dd76da1f02a5">Not started</Status>
+    <MediaServiceKeyPoints xmlns="71af3243-3dd4-4a8d-8c0d-dd76da1f02a5" xsi:nil="true"/>
+  </documentManagement>
+</p:properties>
+</file>
+
+<file path=customXml/item2.xml><?xml version="1.0" encoding="utf-8"?>
+<?mso-contentType ?>
+<FormTemplates xmlns="http://schemas.microsoft.com/sharepoint/v3/contenttype/forms">
+  <Display>DocumentLibraryForm</Display>
+  <Edit>DocumentLibraryForm</Edit>
+  <New>DocumentLibraryForm</New>
+</FormTemplates>
+</file>
+
+<file path=customXml/item3.xml><?xml version="1.0" encoding="utf-8"?>
 <ct:contentTypeSchema xmlns:ct="http://schemas.microsoft.com/office/2006/metadata/contentType" xmlns:ma="http://schemas.microsoft.com/office/2006/metadata/properties/metaAttributes" ct:_="" ma:_="" ma:contentTypeName="Document" ma:contentTypeID="0x01010079F111ED35F8CC479449609E8A0923A6" ma:contentTypeVersion="12" ma:contentTypeDescription="Create a new document." ma:contentTypeScope="" ma:versionID="a410dd7f93c95333ffa1b60ed6adedd1">
   <xsd:schema xmlns:xsd="http://www.w3.org/2001/XMLSchema" xmlns:xs="http://www.w3.org/2001/XMLSchema" xmlns:p="http://schemas.microsoft.com/office/2006/metadata/properties" xmlns:ns2="71af3243-3dd4-4a8d-8c0d-dd76da1f02a5" xmlns:ns3="16c05727-aa75-4e4a-9b5f-8a80a1165891" targetNamespace="http://schemas.microsoft.com/office/2006/metadata/properties" ma:root="true" ma:fieldsID="a936d9baba76aa3866493feff160faab" ns2:_="" ns3:_="">
     <xsd:import namespace="71af3243-3dd4-4a8d-8c0d-dd76da1f02a5"/>
@@ -6427,25 +6674,25 @@
 </ct:contentTypeSchema>
 </file>
 
-<file path=customXml/item2.xml><?xml version="1.0" encoding="utf-8"?>
-<?mso-contentType ?>
-<FormTemplates xmlns="http://schemas.microsoft.com/sharepoint/v3/contenttype/forms">
-  <Display>DocumentLibraryForm</Display>
-  <Edit>DocumentLibraryForm</Edit>
-  <New>DocumentLibraryForm</New>
-</FormTemplates>
+<file path=customXml/itemProps1.xml><?xml version="1.0" encoding="utf-8"?>
+<ds:datastoreItem xmlns:ds="http://schemas.openxmlformats.org/officeDocument/2006/customXml" ds:itemID="{137651BA-F45C-4845-9AB3-E0A65B39F5E1}">
+  <ds:schemaRefs>
+    <ds:schemaRef ds:uri="http://schemas.microsoft.com/office/2006/metadata/properties"/>
+    <ds:schemaRef ds:uri="http://schemas.microsoft.com/office/infopath/2007/PartnerControls"/>
+    <ds:schemaRef ds:uri="71af3243-3dd4-4a8d-8c0d-dd76da1f02a5"/>
+  </ds:schemaRefs>
+</ds:datastoreItem>
 </file>
 
-<file path=customXml/item3.xml><?xml version="1.0" encoding="utf-8"?>
-<p:properties xmlns:p="http://schemas.microsoft.com/office/2006/metadata/properties" xmlns:xsi="http://www.w3.org/2001/XMLSchema-instance" xmlns:pc="http://schemas.microsoft.com/office/infopath/2007/PartnerControls">
-  <documentManagement>
-    <Status xmlns="71af3243-3dd4-4a8d-8c0d-dd76da1f02a5">Not started</Status>
-    <MediaServiceKeyPoints xmlns="71af3243-3dd4-4a8d-8c0d-dd76da1f02a5" xsi:nil="true"/>
-  </documentManagement>
-</p:properties>
+<file path=customXml/itemProps2.xml><?xml version="1.0" encoding="utf-8"?>
+<ds:datastoreItem xmlns:ds="http://schemas.openxmlformats.org/officeDocument/2006/customXml" ds:itemID="{CDB58277-F8DF-46FF-84EC-EF41B835E69F}">
+  <ds:schemaRefs>
+    <ds:schemaRef ds:uri="http://schemas.microsoft.com/sharepoint/v3/contenttype/forms"/>
+  </ds:schemaRefs>
+</ds:datastoreItem>
 </file>
 
-<file path=customXml/itemProps1.xml><?xml version="1.0" encoding="utf-8"?>
+<file path=customXml/itemProps3.xml><?xml version="1.0" encoding="utf-8"?>
 <ds:datastoreItem xmlns:ds="http://schemas.openxmlformats.org/officeDocument/2006/customXml" ds:itemID="{2D276E62-80A3-44DD-9BCC-97ED2B99B57F}">
   <ds:schemaRefs>
     <ds:schemaRef ds:uri="http://schemas.microsoft.com/office/2006/metadata/contentType"/>
@@ -6462,22 +6709,4 @@
     <ds:schemaRef ds:uri="http://schemas.microsoft.com/internal/obd"/>
   </ds:schemaRefs>
 </ds:datastoreItem>
-</file>
-
-<file path=customXml/itemProps2.xml><?xml version="1.0" encoding="utf-8"?>
-<ds:datastoreItem xmlns:ds="http://schemas.openxmlformats.org/officeDocument/2006/customXml" ds:itemID="{CDB58277-F8DF-46FF-84EC-EF41B835E69F}">
-  <ds:schemaRefs>
-    <ds:schemaRef ds:uri="http://schemas.microsoft.com/sharepoint/v3/contenttype/forms"/>
-  </ds:schemaRefs>
-</ds:datastoreItem>
-</file>
-
-<file path=customXml/itemProps3.xml><?xml version="1.0" encoding="utf-8"?>
-<ds:datastoreItem xmlns:ds="http://schemas.openxmlformats.org/officeDocument/2006/customXml" ds:itemID="{137651BA-F45C-4845-9AB3-E0A65B39F5E1}">
-  <ds:schemaRefs>
-    <ds:schemaRef ds:uri="http://schemas.microsoft.com/office/2006/metadata/properties"/>
-    <ds:schemaRef ds:uri="http://schemas.microsoft.com/office/infopath/2007/PartnerControls"/>
-    <ds:schemaRef ds:uri="71af3243-3dd4-4a8d-8c0d-dd76da1f02a5"/>
-  </ds:schemaRefs>
-</ds:datastoreItem>
 </file>
</xml_diff>

<commit_message>
Update formatting of Presentation.pptx
</commit_message>
<xml_diff>
--- a/Presentation.pptx
+++ b/Presentation.pptx
@@ -4355,13 +4355,13 @@
           <a:lstStyle/>
           <a:p>
             <a:r>
-              <a:rPr lang="en-US" sz="2400" dirty="0"/>
+              <a:rPr lang="en-US" sz="2800" dirty="0"/>
               <a:t>DatabaseGui.java is our most complex class, defining the look and frontside functionality of the application.</a:t>
             </a:r>
           </a:p>
           <a:p>
             <a:r>
-              <a:rPr lang="en-US" sz="2400" dirty="0"/>
+              <a:rPr lang="en-US" sz="2800" dirty="0"/>
               <a:t>The user interface was developed using Java’s Swing library.</a:t>
             </a:r>
           </a:p>
@@ -4512,24 +4512,24 @@
           <a:lstStyle/>
           <a:p>
             <a:r>
-              <a:rPr lang="en-US" sz="2400" dirty="0"/>
+              <a:rPr lang="en-US" sz="2800" dirty="0"/>
               <a:t>Our main class is the simplest, serving only as a driver for the other two classes.</a:t>
             </a:r>
           </a:p>
           <a:p>
             <a:r>
-              <a:rPr lang="en-US" sz="2400" dirty="0"/>
+              <a:rPr lang="en-US" sz="2800" dirty="0"/>
               <a:t>The database name, port, username, and password, provided by the user as command line arguments, are fed into a new </a:t>
             </a:r>
             <a:r>
-              <a:rPr lang="en-US" sz="2400" dirty="0" err="1">
+              <a:rPr lang="en-US" sz="2800" dirty="0" err="1">
                 <a:latin typeface="Courier New" panose="02070309020205020404" pitchFamily="49" charset="0"/>
                 <a:cs typeface="Courier New" panose="02070309020205020404" pitchFamily="49" charset="0"/>
               </a:rPr>
               <a:t>DatabaseGui</a:t>
             </a:r>
             <a:r>
-              <a:rPr lang="en-US" sz="2400" dirty="0"/>
+              <a:rPr lang="en-US" sz="2800" dirty="0"/>
               <a:t> object.</a:t>
             </a:r>
           </a:p>
@@ -5630,7 +5630,7 @@
           <a:p>
             <a:r>
               <a:rPr lang="en-US" dirty="0"/>
-              <a:t>1:N relationship type</a:t>
+              <a:t>1:N Relationships</a:t>
             </a:r>
           </a:p>
         </p:txBody>
@@ -5659,32 +5659,32 @@
           <a:lstStyle/>
           <a:p>
             <a:r>
+              <a:rPr lang="en-US" sz="2800" dirty="0">
+                <a:latin typeface="Courier New" panose="02070309020205020404" pitchFamily="49" charset="0"/>
+                <a:cs typeface="Courier New" panose="02070309020205020404" pitchFamily="49" charset="0"/>
+              </a:rPr>
+              <a:t>order</a:t>
+            </a:r>
+            <a:r>
+              <a:rPr lang="en-US" sz="2800" dirty="0"/>
+              <a:t>:</a:t>
+            </a:r>
+          </a:p>
+          <a:p>
+            <a:pPr lvl="1"/>
+            <a:r>
               <a:rPr lang="en-US" sz="2400" dirty="0">
                 <a:latin typeface="Courier New" panose="02070309020205020404" pitchFamily="49" charset="0"/>
                 <a:cs typeface="Courier New" panose="02070309020205020404" pitchFamily="49" charset="0"/>
               </a:rPr>
-              <a:t>order</a:t>
-            </a:r>
-            <a:r>
-              <a:rPr lang="en-US" sz="2400" dirty="0"/>
-              <a:t>:</a:t>
-            </a:r>
+              <a:t>customer</a:t>
+            </a:r>
+            <a:endParaRPr lang="en-US" sz="2400" dirty="0"/>
           </a:p>
           <a:p>
             <a:pPr lvl="1"/>
             <a:r>
-              <a:rPr lang="en-US" sz="2200" dirty="0">
-                <a:latin typeface="Courier New" panose="02070309020205020404" pitchFamily="49" charset="0"/>
-                <a:cs typeface="Courier New" panose="02070309020205020404" pitchFamily="49" charset="0"/>
-              </a:rPr>
-              <a:t>customer</a:t>
-            </a:r>
-            <a:endParaRPr lang="en-US" sz="2200" dirty="0"/>
-          </a:p>
-          <a:p>
-            <a:pPr lvl="1"/>
-            <a:r>
-              <a:rPr lang="en-US" sz="2200" dirty="0">
+              <a:rPr lang="en-US" sz="2400" dirty="0">
                 <a:latin typeface="Courier New" panose="02070309020205020404" pitchFamily="49" charset="0"/>
                 <a:cs typeface="Courier New" panose="02070309020205020404" pitchFamily="49" charset="0"/>
               </a:rPr>
@@ -5694,7 +5694,7 @@
           <a:p>
             <a:pPr lvl="1"/>
             <a:r>
-              <a:rPr lang="en-US" sz="2200" dirty="0">
+              <a:rPr lang="en-US" sz="2400" dirty="0">
                 <a:latin typeface="Courier New" panose="02070309020205020404" pitchFamily="49" charset="0"/>
                 <a:cs typeface="Courier New" panose="02070309020205020404" pitchFamily="49" charset="0"/>
               </a:rPr>
@@ -5703,27 +5703,27 @@
           </a:p>
           <a:p>
             <a:r>
+              <a:rPr lang="en-US" sz="2800" dirty="0">
+                <a:latin typeface="Courier New" panose="02070309020205020404" pitchFamily="49" charset="0"/>
+                <a:cs typeface="Courier New" panose="02070309020205020404" pitchFamily="49" charset="0"/>
+              </a:rPr>
+              <a:t>book:</a:t>
+            </a:r>
+          </a:p>
+          <a:p>
+            <a:pPr lvl="1"/>
+            <a:r>
               <a:rPr lang="en-US" sz="2400" dirty="0">
                 <a:latin typeface="Courier New" panose="02070309020205020404" pitchFamily="49" charset="0"/>
                 <a:cs typeface="Courier New" panose="02070309020205020404" pitchFamily="49" charset="0"/>
               </a:rPr>
-              <a:t>book:</a:t>
+              <a:t>subject</a:t>
             </a:r>
           </a:p>
           <a:p>
             <a:pPr lvl="1"/>
             <a:r>
-              <a:rPr lang="en-US" sz="2200" dirty="0">
-                <a:latin typeface="Courier New" panose="02070309020205020404" pitchFamily="49" charset="0"/>
-                <a:cs typeface="Courier New" panose="02070309020205020404" pitchFamily="49" charset="0"/>
-              </a:rPr>
-              <a:t>subject</a:t>
-            </a:r>
-          </a:p>
-          <a:p>
-            <a:pPr lvl="1"/>
-            <a:r>
-              <a:rPr lang="en-US" sz="2200" dirty="0">
+              <a:rPr lang="en-US" sz="2400" dirty="0">
                 <a:latin typeface="Courier New" panose="02070309020205020404" pitchFamily="49" charset="0"/>
                 <a:cs typeface="Courier New" panose="02070309020205020404" pitchFamily="49" charset="0"/>
               </a:rPr>
@@ -5785,7 +5785,7 @@
           <a:p>
             <a:r>
               <a:rPr lang="en-US" dirty="0"/>
-              <a:t>Others</a:t>
+              <a:t>Other Notes</a:t>
             </a:r>
           </a:p>
         </p:txBody>
@@ -5814,82 +5814,79 @@
           <a:lstStyle/>
           <a:p>
             <a:r>
-              <a:rPr lang="en-US" sz="2400" dirty="0"/>
-              <a:t>M:N relationship type</a:t>
-            </a:r>
-          </a:p>
-          <a:p>
-            <a:pPr lvl="1"/>
-            <a:r>
-              <a:rPr lang="en-US" sz="2200" dirty="0" err="1">
+              <a:rPr lang="en-US" sz="3200" dirty="0"/>
+              <a:t>M:N relationship type is used for </a:t>
+            </a:r>
+            <a:r>
+              <a:rPr lang="en-US" sz="3200" dirty="0" err="1">
                 <a:latin typeface="Courier New" panose="02070309020205020404" pitchFamily="49" charset="0"/>
                 <a:cs typeface="Courier New" panose="02070309020205020404" pitchFamily="49" charset="0"/>
               </a:rPr>
               <a:t>order_detail</a:t>
             </a:r>
             <a:r>
-              <a:rPr lang="en-US" sz="2200" dirty="0">
+              <a:rPr lang="en-US" sz="3200" dirty="0">
                 <a:latin typeface="Courier New" panose="02070309020205020404" pitchFamily="49" charset="0"/>
                 <a:cs typeface="Courier New" panose="02070309020205020404" pitchFamily="49" charset="0"/>
               </a:rPr>
               <a:t> ↔ book</a:t>
             </a:r>
-          </a:p>
-          <a:p>
-            <a:r>
-              <a:rPr lang="en-US" sz="2400" dirty="0"/>
+            <a:r>
+              <a:rPr lang="en-US" sz="2800" dirty="0">
+                <a:latin typeface="Century Gothic" panose="020B0502020202020204" pitchFamily="34" charset="0"/>
+                <a:cs typeface="Courier New" panose="02070309020205020404" pitchFamily="49" charset="0"/>
+              </a:rPr>
+              <a:t>.</a:t>
+            </a:r>
+          </a:p>
+          <a:p>
+            <a:r>
+              <a:rPr lang="en-US" sz="3200" dirty="0"/>
               <a:t>Weak entity (</a:t>
             </a:r>
             <a:r>
-              <a:rPr lang="en-US" sz="2400" dirty="0" err="1">
+              <a:rPr lang="en-US" sz="3200" dirty="0" err="1">
                 <a:latin typeface="Courier New" panose="02070309020205020404" pitchFamily="49" charset="0"/>
                 <a:cs typeface="Courier New" panose="02070309020205020404" pitchFamily="49" charset="0"/>
               </a:rPr>
               <a:t>order_detail</a:t>
             </a:r>
             <a:r>
-              <a:rPr lang="en-US" sz="2400" dirty="0"/>
+              <a:rPr lang="en-US" sz="3200" dirty="0"/>
               <a:t>)</a:t>
             </a:r>
           </a:p>
           <a:p>
             <a:pPr lvl="1"/>
             <a:r>
-              <a:rPr lang="en-US" sz="2200" dirty="0"/>
+              <a:rPr lang="en-US" sz="2800" dirty="0"/>
               <a:t>Relies on </a:t>
             </a:r>
             <a:r>
-              <a:rPr lang="en-US" sz="2200" dirty="0">
+              <a:rPr lang="en-US" sz="2800" dirty="0">
                 <a:latin typeface="Courier New" panose="02070309020205020404" pitchFamily="49" charset="0"/>
                 <a:cs typeface="Courier New" panose="02070309020205020404" pitchFamily="49" charset="0"/>
               </a:rPr>
               <a:t>order</a:t>
             </a:r>
             <a:r>
-              <a:rPr lang="en-US" sz="2200" dirty="0"/>
-              <a:t> for identification</a:t>
+              <a:rPr lang="en-US" sz="2800" dirty="0"/>
+              <a:t> for identification.</a:t>
             </a:r>
           </a:p>
           <a:p>
             <a:pPr lvl="1"/>
             <a:r>
-              <a:rPr lang="en-US" sz="2200" dirty="0">
+              <a:rPr lang="en-US" sz="2800" dirty="0">
                 <a:latin typeface="Courier New" panose="02070309020205020404" pitchFamily="49" charset="0"/>
                 <a:cs typeface="Courier New" panose="02070309020205020404" pitchFamily="49" charset="0"/>
               </a:rPr>
               <a:t>book</a:t>
             </a:r>
             <a:r>
-              <a:rPr lang="en-US" sz="2200" dirty="0"/>
-              <a:t> does not provide identification. Therefore, it has only 1 identifying relationship </a:t>
-            </a:r>
-          </a:p>
-          <a:p>
-            <a:pPr lvl="1"/>
-            <a:endParaRPr lang="en-US" sz="2200" dirty="0">
-              <a:latin typeface="Courier New" panose="02070309020205020404" pitchFamily="49" charset="0"/>
-              <a:cs typeface="Courier New" panose="02070309020205020404" pitchFamily="49" charset="0"/>
-            </a:endParaRPr>
+              <a:rPr lang="en-US" sz="2800" dirty="0"/>
+              <a:t> does not provide identification. Therefore, it has only one identifying relationship.</a:t>
+            </a:r>
           </a:p>
         </p:txBody>
       </p:sp>
@@ -6030,57 +6027,57 @@
         <p:spPr/>
         <p:txBody>
           <a:bodyPr>
-            <a:normAutofit/>
+            <a:normAutofit lnSpcReduction="10000"/>
           </a:bodyPr>
           <a:lstStyle/>
           <a:p>
             <a:r>
-              <a:rPr lang="en-US" sz="2400" dirty="0"/>
+              <a:rPr lang="en-US" sz="2800" dirty="0"/>
               <a:t>Our code for connecting the user application to the database was contained in the </a:t>
             </a:r>
             <a:r>
-              <a:rPr lang="en-US" sz="2400" dirty="0" err="1">
+              <a:rPr lang="en-US" sz="2800" dirty="0" err="1">
                 <a:latin typeface="Courier New" panose="02070309020205020404" pitchFamily="49" charset="0"/>
                 <a:cs typeface="Courier New" panose="02070309020205020404" pitchFamily="49" charset="0"/>
               </a:rPr>
               <a:t>DatabaseInterface</a:t>
             </a:r>
             <a:r>
-              <a:rPr lang="en-US" sz="2400" dirty="0"/>
+              <a:rPr lang="en-US" sz="2800" dirty="0"/>
               <a:t> class.</a:t>
             </a:r>
           </a:p>
           <a:p>
             <a:r>
-              <a:rPr lang="en-US" sz="2400" dirty="0"/>
+              <a:rPr lang="en-US" sz="2800" dirty="0"/>
               <a:t>This class is a fairly straightforward implementation pf JDBC, taking a database name, port, username, and password as arguments for establishing a connection.</a:t>
             </a:r>
           </a:p>
           <a:p>
             <a:r>
-              <a:rPr lang="en-US" sz="2400" dirty="0"/>
+              <a:rPr lang="en-US" sz="2800" dirty="0"/>
               <a:t>The method </a:t>
             </a:r>
             <a:r>
-              <a:rPr lang="en-US" sz="2400" dirty="0" err="1">
+              <a:rPr lang="en-US" sz="2800" dirty="0" err="1">
                 <a:latin typeface="Courier New" panose="02070309020205020404" pitchFamily="49" charset="0"/>
                 <a:cs typeface="Courier New" panose="02070309020205020404" pitchFamily="49" charset="0"/>
               </a:rPr>
               <a:t>execStatement</a:t>
             </a:r>
             <a:r>
-              <a:rPr lang="en-US" sz="2400" dirty="0"/>
+              <a:rPr lang="en-US" sz="2800" dirty="0"/>
               <a:t> takes a query or statement string as an input, then returns the </a:t>
             </a:r>
             <a:r>
-              <a:rPr lang="en-US" sz="2400" dirty="0" err="1">
+              <a:rPr lang="en-US" sz="2800" dirty="0" err="1">
                 <a:latin typeface="Courier New" panose="02070309020205020404" pitchFamily="49" charset="0"/>
                 <a:cs typeface="Courier New" panose="02070309020205020404" pitchFamily="49" charset="0"/>
               </a:rPr>
               <a:t>ResultSet</a:t>
             </a:r>
             <a:r>
-              <a:rPr lang="en-US" sz="2400" dirty="0"/>
+              <a:rPr lang="en-US" sz="2800" dirty="0"/>
               <a:t>.</a:t>
             </a:r>
           </a:p>
@@ -6445,15 +6442,6 @@
 </file>
 
 <file path=customXml/item2.xml><?xml version="1.0" encoding="utf-8"?>
-<?mso-contentType ?>
-<FormTemplates xmlns="http://schemas.microsoft.com/sharepoint/v3/contenttype/forms">
-  <Display>DocumentLibraryForm</Display>
-  <Edit>DocumentLibraryForm</Edit>
-  <New>DocumentLibraryForm</New>
-</FormTemplates>
-</file>
-
-<file path=customXml/item3.xml><?xml version="1.0" encoding="utf-8"?>
 <ct:contentTypeSchema xmlns:ct="http://schemas.microsoft.com/office/2006/metadata/contentType" xmlns:ma="http://schemas.microsoft.com/office/2006/metadata/properties/metaAttributes" ct:_="" ma:_="" ma:contentTypeName="Document" ma:contentTypeID="0x01010079F111ED35F8CC479449609E8A0923A6" ma:contentTypeVersion="12" ma:contentTypeDescription="Create a new document." ma:contentTypeScope="" ma:versionID="a410dd7f93c95333ffa1b60ed6adedd1">
   <xsd:schema xmlns:xsd="http://www.w3.org/2001/XMLSchema" xmlns:xs="http://www.w3.org/2001/XMLSchema" xmlns:p="http://schemas.microsoft.com/office/2006/metadata/properties" xmlns:ns2="71af3243-3dd4-4a8d-8c0d-dd76da1f02a5" xmlns:ns3="16c05727-aa75-4e4a-9b5f-8a80a1165891" targetNamespace="http://schemas.microsoft.com/office/2006/metadata/properties" ma:root="true" ma:fieldsID="a936d9baba76aa3866493feff160faab" ns2:_="" ns3:_="">
     <xsd:import namespace="71af3243-3dd4-4a8d-8c0d-dd76da1f02a5"/>
@@ -6674,6 +6662,15 @@
 </ct:contentTypeSchema>
 </file>
 
+<file path=customXml/item3.xml><?xml version="1.0" encoding="utf-8"?>
+<?mso-contentType ?>
+<FormTemplates xmlns="http://schemas.microsoft.com/sharepoint/v3/contenttype/forms">
+  <Display>DocumentLibraryForm</Display>
+  <Edit>DocumentLibraryForm</Edit>
+  <New>DocumentLibraryForm</New>
+</FormTemplates>
+</file>
+
 <file path=customXml/itemProps1.xml><?xml version="1.0" encoding="utf-8"?>
 <ds:datastoreItem xmlns:ds="http://schemas.openxmlformats.org/officeDocument/2006/customXml" ds:itemID="{137651BA-F45C-4845-9AB3-E0A65B39F5E1}">
   <ds:schemaRefs>
@@ -6685,14 +6682,6 @@
 </file>
 
 <file path=customXml/itemProps2.xml><?xml version="1.0" encoding="utf-8"?>
-<ds:datastoreItem xmlns:ds="http://schemas.openxmlformats.org/officeDocument/2006/customXml" ds:itemID="{CDB58277-F8DF-46FF-84EC-EF41B835E69F}">
-  <ds:schemaRefs>
-    <ds:schemaRef ds:uri="http://schemas.microsoft.com/sharepoint/v3/contenttype/forms"/>
-  </ds:schemaRefs>
-</ds:datastoreItem>
-</file>
-
-<file path=customXml/itemProps3.xml><?xml version="1.0" encoding="utf-8"?>
 <ds:datastoreItem xmlns:ds="http://schemas.openxmlformats.org/officeDocument/2006/customXml" ds:itemID="{2D276E62-80A3-44DD-9BCC-97ED2B99B57F}">
   <ds:schemaRefs>
     <ds:schemaRef ds:uri="http://schemas.microsoft.com/office/2006/metadata/contentType"/>
@@ -6709,4 +6698,12 @@
     <ds:schemaRef ds:uri="http://schemas.microsoft.com/internal/obd"/>
   </ds:schemaRefs>
 </ds:datastoreItem>
+</file>
+
+<file path=customXml/itemProps3.xml><?xml version="1.0" encoding="utf-8"?>
+<ds:datastoreItem xmlns:ds="http://schemas.openxmlformats.org/officeDocument/2006/customXml" ds:itemID="{CDB58277-F8DF-46FF-84EC-EF41B835E69F}">
+  <ds:schemaRefs>
+    <ds:schemaRef ds:uri="http://schemas.microsoft.com/sharepoint/v3/contenttype/forms"/>
+  </ds:schemaRefs>
+</ds:datastoreItem>
 </file>
</xml_diff>